<commit_message>
Add Block A material
</commit_message>
<xml_diff>
--- a/Web Development/Block A/HTML CSS Tips and Tricks 1.pptx
+++ b/Web Development/Block A/HTML CSS Tips and Tricks 1.pptx
@@ -12,21 +12,23 @@
     <p:sldId id="257" r:id="rId6"/>
     <p:sldId id="258" r:id="rId7"/>
     <p:sldId id="259" r:id="rId8"/>
+    <p:sldId id="260" r:id="rId9"/>
+    <p:sldId id="261" r:id="rId10"/>
   </p:sldIdLst>
   <p:sldSz cy="5143500" cx="9144000"/>
   <p:notesSz cx="6858000" cy="9144000"/>
   <p:embeddedFontLst>
     <p:embeddedFont>
       <p:font typeface="Montserrat"/>
-      <p:regular r:id="rId9"/>
-      <p:bold r:id="rId10"/>
-      <p:italic r:id="rId11"/>
-      <p:boldItalic r:id="rId12"/>
+      <p:regular r:id="rId11"/>
+      <p:bold r:id="rId12"/>
+      <p:italic r:id="rId13"/>
+      <p:boldItalic r:id="rId14"/>
     </p:embeddedFont>
     <p:embeddedFont>
       <p:font typeface="Work Sans"/>
-      <p:regular r:id="rId13"/>
-      <p:bold r:id="rId14"/>
+      <p:regular r:id="rId15"/>
+      <p:bold r:id="rId16"/>
     </p:embeddedFont>
   </p:embeddedFontLst>
   <p:defaultTextStyle>
@@ -740,6 +742,196 @@
       <p:sp>
         <p:nvSpPr>
           <p:cNvPr id="72" name="Shape 72"/>
+          <p:cNvSpPr txBox="1"/>
+          <p:nvPr>
+            <p:ph idx="1" type="body"/>
+          </p:nvPr>
+        </p:nvSpPr>
+        <p:spPr>
+          <a:xfrm>
+            <a:off x="685800" y="4343400"/>
+            <a:ext cx="5486400" cy="4114800"/>
+          </a:xfrm>
+          <a:prstGeom prst="rect">
+            <a:avLst/>
+          </a:prstGeom>
+        </p:spPr>
+        <p:txBody>
+          <a:bodyPr anchorCtr="0" anchor="t" bIns="91425" lIns="91425" rIns="91425" wrap="square" tIns="91425">
+            <a:noAutofit/>
+          </a:bodyPr>
+          <a:lstStyle/>
+          <a:p>
+            <a:pPr lvl="0" rtl="0">
+              <a:spcBef>
+                <a:spcPts val="0"/>
+              </a:spcBef>
+              <a:buNone/>
+            </a:pPr>
+            <a:r>
+              <a:t/>
+            </a:r>
+            <a:endParaRPr/>
+          </a:p>
+        </p:txBody>
+      </p:sp>
+    </p:spTree>
+  </p:cSld>
+  <p:clrMapOvr>
+    <a:masterClrMapping/>
+  </p:clrMapOvr>
+</p:notes>
+</file>
+
+<file path=ppt/notesSlides/notesSlide5.xml><?xml version="1.0" encoding="utf-8"?>
+<p:notes xmlns:a="http://schemas.openxmlformats.org/drawingml/2006/main" xmlns:r="http://schemas.openxmlformats.org/officeDocument/2006/relationships" xmlns:mc="http://schemas.openxmlformats.org/markup-compatibility/2006" xmlns:mv="urn:schemas-microsoft-com:mac:vml" xmlns:p="http://schemas.openxmlformats.org/presentationml/2006/main" xmlns:c="http://schemas.openxmlformats.org/drawingml/2006/chart" xmlns:dgm="http://schemas.openxmlformats.org/drawingml/2006/diagram" xmlns:o="urn:schemas-microsoft-com:office:office" xmlns:v="urn:schemas-microsoft-com:vml" xmlns:pvml="urn:schemas-microsoft-com:office:powerpoint" xmlns:com="http://schemas.openxmlformats.org/drawingml/2006/compatibility" xmlns:p14="http://schemas.microsoft.com/office/powerpoint/2010/main" xmlns:p15="http://schemas.microsoft.com/office/powerpoint/2012/main" showMasterPhAnim="0" showMasterSp="0">
+  <p:cSld>
+    <p:spTree>
+      <p:nvGrpSpPr>
+        <p:cNvPr id="77" name="Shape 77"/>
+        <p:cNvGrpSpPr/>
+        <p:nvPr/>
+      </p:nvGrpSpPr>
+      <p:grpSpPr>
+        <a:xfrm>
+          <a:off x="0" y="0"/>
+          <a:ext cx="0" cy="0"/>
+          <a:chOff x="0" y="0"/>
+          <a:chExt cx="0" cy="0"/>
+        </a:xfrm>
+      </p:grpSpPr>
+      <p:sp>
+        <p:nvSpPr>
+          <p:cNvPr id="78" name="Shape 78"/>
+          <p:cNvSpPr/>
+          <p:nvPr>
+            <p:ph idx="2" type="sldImg"/>
+          </p:nvPr>
+        </p:nvSpPr>
+        <p:spPr>
+          <a:xfrm>
+            <a:off x="381300" y="685800"/>
+            <a:ext cx="6096000" cy="3429000"/>
+          </a:xfrm>
+          <a:custGeom>
+            <a:pathLst>
+              <a:path extrusionOk="0" h="120000" w="120000">
+                <a:moveTo>
+                  <a:pt x="0" y="0"/>
+                </a:moveTo>
+                <a:lnTo>
+                  <a:pt x="120000" y="0"/>
+                </a:lnTo>
+                <a:lnTo>
+                  <a:pt x="120000" y="120000"/>
+                </a:lnTo>
+                <a:lnTo>
+                  <a:pt x="0" y="120000"/>
+                </a:lnTo>
+                <a:close/>
+              </a:path>
+            </a:pathLst>
+          </a:custGeom>
+        </p:spPr>
+      </p:sp>
+      <p:sp>
+        <p:nvSpPr>
+          <p:cNvPr id="79" name="Shape 79"/>
+          <p:cNvSpPr txBox="1"/>
+          <p:nvPr>
+            <p:ph idx="1" type="body"/>
+          </p:nvPr>
+        </p:nvSpPr>
+        <p:spPr>
+          <a:xfrm>
+            <a:off x="685800" y="4343400"/>
+            <a:ext cx="5486400" cy="4114800"/>
+          </a:xfrm>
+          <a:prstGeom prst="rect">
+            <a:avLst/>
+          </a:prstGeom>
+        </p:spPr>
+        <p:txBody>
+          <a:bodyPr anchorCtr="0" anchor="t" bIns="91425" lIns="91425" rIns="91425" wrap="square" tIns="91425">
+            <a:noAutofit/>
+          </a:bodyPr>
+          <a:lstStyle/>
+          <a:p>
+            <a:pPr lvl="0" rtl="0">
+              <a:spcBef>
+                <a:spcPts val="0"/>
+              </a:spcBef>
+              <a:buNone/>
+            </a:pPr>
+            <a:r>
+              <a:t/>
+            </a:r>
+            <a:endParaRPr/>
+          </a:p>
+        </p:txBody>
+      </p:sp>
+    </p:spTree>
+  </p:cSld>
+  <p:clrMapOvr>
+    <a:masterClrMapping/>
+  </p:clrMapOvr>
+</p:notes>
+</file>
+
+<file path=ppt/notesSlides/notesSlide6.xml><?xml version="1.0" encoding="utf-8"?>
+<p:notes xmlns:a="http://schemas.openxmlformats.org/drawingml/2006/main" xmlns:r="http://schemas.openxmlformats.org/officeDocument/2006/relationships" xmlns:mc="http://schemas.openxmlformats.org/markup-compatibility/2006" xmlns:mv="urn:schemas-microsoft-com:mac:vml" xmlns:p="http://schemas.openxmlformats.org/presentationml/2006/main" xmlns:c="http://schemas.openxmlformats.org/drawingml/2006/chart" xmlns:dgm="http://schemas.openxmlformats.org/drawingml/2006/diagram" xmlns:o="urn:schemas-microsoft-com:office:office" xmlns:v="urn:schemas-microsoft-com:vml" xmlns:pvml="urn:schemas-microsoft-com:office:powerpoint" xmlns:com="http://schemas.openxmlformats.org/drawingml/2006/compatibility" xmlns:p14="http://schemas.microsoft.com/office/powerpoint/2010/main" xmlns:p15="http://schemas.microsoft.com/office/powerpoint/2012/main" showMasterPhAnim="0" showMasterSp="0">
+  <p:cSld>
+    <p:spTree>
+      <p:nvGrpSpPr>
+        <p:cNvPr id="84" name="Shape 84"/>
+        <p:cNvGrpSpPr/>
+        <p:nvPr/>
+      </p:nvGrpSpPr>
+      <p:grpSpPr>
+        <a:xfrm>
+          <a:off x="0" y="0"/>
+          <a:ext cx="0" cy="0"/>
+          <a:chOff x="0" y="0"/>
+          <a:chExt cx="0" cy="0"/>
+        </a:xfrm>
+      </p:grpSpPr>
+      <p:sp>
+        <p:nvSpPr>
+          <p:cNvPr id="85" name="Shape 85"/>
+          <p:cNvSpPr/>
+          <p:nvPr>
+            <p:ph idx="2" type="sldImg"/>
+          </p:nvPr>
+        </p:nvSpPr>
+        <p:spPr>
+          <a:xfrm>
+            <a:off x="381300" y="685800"/>
+            <a:ext cx="6096000" cy="3429000"/>
+          </a:xfrm>
+          <a:custGeom>
+            <a:pathLst>
+              <a:path extrusionOk="0" h="120000" w="120000">
+                <a:moveTo>
+                  <a:pt x="0" y="0"/>
+                </a:moveTo>
+                <a:lnTo>
+                  <a:pt x="120000" y="0"/>
+                </a:lnTo>
+                <a:lnTo>
+                  <a:pt x="120000" y="120000"/>
+                </a:lnTo>
+                <a:lnTo>
+                  <a:pt x="0" y="120000"/>
+                </a:lnTo>
+                <a:close/>
+              </a:path>
+            </a:pathLst>
+          </a:custGeom>
+        </p:spPr>
+      </p:sp>
+      <p:sp>
+        <p:nvSpPr>
+          <p:cNvPr id="86" name="Shape 86"/>
           <p:cNvSpPr txBox="1"/>
           <p:nvPr>
             <p:ph idx="1" type="body"/>
@@ -4157,7 +4349,7 @@
                 <a:cs typeface="Work Sans"/>
                 <a:sym typeface="Work Sans"/>
               </a:rPr>
-              <a:t>Good Fonts</a:t>
+              <a:t>Color Picker</a:t>
             </a:r>
           </a:p>
         </p:txBody>
@@ -4167,6 +4359,47 @@
           <p:cNvPr id="61" name="Shape 61"/>
           <p:cNvSpPr txBox="1"/>
           <p:nvPr>
+            <p:ph idx="1" type="subTitle"/>
+          </p:nvPr>
+        </p:nvSpPr>
+        <p:spPr>
+          <a:xfrm>
+            <a:off x="265500" y="2803075"/>
+            <a:ext cx="4045200" cy="1235100"/>
+          </a:xfrm>
+          <a:prstGeom prst="rect">
+            <a:avLst/>
+          </a:prstGeom>
+        </p:spPr>
+        <p:txBody>
+          <a:bodyPr anchorCtr="0" anchor="t" bIns="91425" lIns="91425" rIns="91425" wrap="square" tIns="91425">
+            <a:noAutofit/>
+          </a:bodyPr>
+          <a:lstStyle/>
+          <a:p>
+            <a:pPr lvl="0">
+              <a:spcBef>
+                <a:spcPts val="0"/>
+              </a:spcBef>
+              <a:buNone/>
+            </a:pPr>
+            <a:r>
+              <a:rPr lang="en" sz="1600">
+                <a:latin typeface="Work Sans"/>
+                <a:ea typeface="Work Sans"/>
+                <a:cs typeface="Work Sans"/>
+                <a:sym typeface="Work Sans"/>
+              </a:rPr>
+              <a:t>Wondering where to get color codes? These are some pretty good tools.</a:t>
+            </a:r>
+          </a:p>
+        </p:txBody>
+      </p:sp>
+      <p:sp>
+        <p:nvSpPr>
+          <p:cNvPr id="62" name="Shape 62"/>
+          <p:cNvSpPr txBox="1"/>
+          <p:nvPr>
             <p:ph idx="2" type="body"/>
           </p:nvPr>
         </p:nvSpPr>
@@ -4185,7 +4418,7 @@
           </a:bodyPr>
           <a:lstStyle/>
           <a:p>
-            <a:pPr indent="-342900" lvl="0" marL="457200" rtl="0">
+            <a:pPr indent="-336550" lvl="0" marL="457200" rtl="0">
               <a:spcBef>
                 <a:spcPts val="0"/>
               </a:spcBef>
@@ -4197,7 +4430,64 @@
               <a:buAutoNum type="arabicPeriod"/>
             </a:pPr>
             <a:r>
-              <a:rPr lang="en" u="sng">
+              <a:rPr lang="en" sz="1700">
+                <a:latin typeface="Work Sans"/>
+                <a:ea typeface="Work Sans"/>
+                <a:cs typeface="Work Sans"/>
+                <a:sym typeface="Work Sans"/>
+              </a:rPr>
+              <a:t>Color Picker (colorpicker.com)</a:t>
+            </a:r>
+            <a:br>
+              <a:rPr lang="en" sz="1700">
+                <a:latin typeface="Work Sans"/>
+                <a:ea typeface="Work Sans"/>
+                <a:cs typeface="Work Sans"/>
+                <a:sym typeface="Work Sans"/>
+              </a:rPr>
+            </a:br>
+            <a:r>
+              <a:rPr lang="en" sz="1500">
+                <a:latin typeface="Work Sans"/>
+                <a:ea typeface="Work Sans"/>
+                <a:cs typeface="Work Sans"/>
+                <a:sym typeface="Work Sans"/>
+              </a:rPr>
+              <a:t>Just a normal color picker.</a:t>
+            </a:r>
+          </a:p>
+          <a:p>
+            <a:pPr indent="-336550" lvl="0" marL="457200">
+              <a:spcBef>
+                <a:spcPts val="0"/>
+              </a:spcBef>
+              <a:spcAft>
+                <a:spcPts val="0"/>
+              </a:spcAft>
+              <a:buSzPct val="100000"/>
+              <a:buFont typeface="Work Sans"/>
+              <a:buAutoNum type="arabicPeriod"/>
+            </a:pPr>
+            <a:r>
+              <a:rPr lang="en" sz="1700">
+                <a:latin typeface="Work Sans"/>
+                <a:ea typeface="Work Sans"/>
+                <a:cs typeface="Work Sans"/>
+                <a:sym typeface="Work Sans"/>
+              </a:rPr>
+              <a:t>ColourLovers </a:t>
+            </a:r>
+            <a:r>
+              <a:rPr lang="en" sz="1400">
+                <a:latin typeface="Work Sans"/>
+                <a:ea typeface="Work Sans"/>
+                <a:cs typeface="Work Sans"/>
+                <a:sym typeface="Work Sans"/>
+              </a:rPr>
+              <a:t>(</a:t>
+            </a:r>
+            <a:r>
+              <a:rPr lang="en" sz="1400" u="sng">
                 <a:solidFill>
                   <a:schemeClr val="hlink"/>
                 </a:solidFill>
@@ -4207,80 +4497,8 @@
                 <a:sym typeface="Work Sans"/>
                 <a:hlinkClick r:id="rId3"/>
               </a:rPr>
-              <a:t>https://fonts.google.com/</a:t>
-            </a:r>
-          </a:p>
-          <a:p>
-            <a:pPr indent="-317500" lvl="1" marL="914400" rtl="0">
-              <a:spcBef>
-                <a:spcPts val="0"/>
-              </a:spcBef>
-              <a:spcAft>
-                <a:spcPts val="0"/>
-              </a:spcAft>
-              <a:buSzPct val="100000"/>
-              <a:buFont typeface="Work Sans"/>
-              <a:buAutoNum type="alphaLcPeriod"/>
-            </a:pPr>
-            <a:r>
-              <a:rPr lang="en">
-                <a:latin typeface="Work Sans"/>
-                <a:ea typeface="Work Sans"/>
-                <a:cs typeface="Work Sans"/>
-                <a:sym typeface="Work Sans"/>
-              </a:rPr>
-              <a:t>Select font, copy and paste the "embed font" link in your webpage head.</a:t>
-            </a:r>
-          </a:p>
-          <a:p>
-            <a:pPr indent="-317500" lvl="1" marL="914400" rtl="0">
-              <a:spcBef>
-                <a:spcPts val="0"/>
-              </a:spcBef>
-              <a:buSzPct val="100000"/>
-              <a:buFont typeface="Work Sans"/>
-              <a:buAutoNum type="alphaLcPeriod"/>
-            </a:pPr>
-            <a:r>
-              <a:rPr lang="en">
-                <a:latin typeface="Work Sans"/>
-                <a:ea typeface="Work Sans"/>
-                <a:cs typeface="Work Sans"/>
-                <a:sym typeface="Work Sans"/>
-              </a:rPr>
-              <a:t>Specify the font in your CSS.</a:t>
-            </a:r>
-          </a:p>
-          <a:p>
-            <a:pPr lvl="0" rtl="0">
-              <a:spcBef>
-                <a:spcPts val="0"/>
-              </a:spcBef>
-              <a:spcAft>
-                <a:spcPts val="0"/>
-              </a:spcAft>
-              <a:buNone/>
-            </a:pPr>
-            <a:r>
-              <a:t/>
-            </a:r>
-            <a:endParaRPr sz="1400">
-              <a:latin typeface="Work Sans"/>
-              <a:ea typeface="Work Sans"/>
-              <a:cs typeface="Work Sans"/>
-              <a:sym typeface="Work Sans"/>
-            </a:endParaRPr>
-          </a:p>
-          <a:p>
-            <a:pPr lvl="0" rtl="0">
-              <a:spcBef>
-                <a:spcPts val="0"/>
-              </a:spcBef>
-              <a:spcAft>
-                <a:spcPts val="0"/>
-              </a:spcAft>
-              <a:buNone/>
-            </a:pPr>
+              <a:t>http://www.colourlovers.com/</a:t>
+            </a:r>
             <a:r>
               <a:rPr lang="en" sz="1400">
                 <a:latin typeface="Work Sans"/>
@@ -4288,73 +4506,16 @@
                 <a:cs typeface="Work Sans"/>
                 <a:sym typeface="Work Sans"/>
               </a:rPr>
-              <a:t>For design inspiration and pairings:</a:t>
-            </a:r>
-          </a:p>
-          <a:p>
-            <a:pPr indent="-317500" lvl="0" marL="457200" rtl="0">
-              <a:spcBef>
-                <a:spcPts val="0"/>
-              </a:spcBef>
-              <a:spcAft>
-                <a:spcPts val="0"/>
-              </a:spcAft>
-              <a:buSzPct val="100000"/>
-              <a:buFont typeface="Work Sans"/>
-              <a:buChar char="●"/>
-            </a:pPr>
-            <a:r>
-              <a:rPr lang="en" sz="1400" u="sng">
-                <a:solidFill>
-                  <a:schemeClr val="hlink"/>
-                </a:solidFill>
+              <a:t>)</a:t>
+            </a:r>
+            <a:br>
+              <a:rPr lang="en" sz="1700">
                 <a:latin typeface="Work Sans"/>
                 <a:ea typeface="Work Sans"/>
                 <a:cs typeface="Work Sans"/>
                 <a:sym typeface="Work Sans"/>
-                <a:hlinkClick r:id="rId4"/>
               </a:rPr>
-              <a:t>https://www.typewolf.com/</a:t>
-            </a:r>
-          </a:p>
-          <a:p>
-            <a:pPr indent="-317500" lvl="0" marL="457200" rtl="0">
-              <a:spcBef>
-                <a:spcPts val="0"/>
-              </a:spcBef>
-              <a:spcAft>
-                <a:spcPts val="0"/>
-              </a:spcAft>
-              <a:buSzPct val="100000"/>
-              <a:buFont typeface="Work Sans"/>
-              <a:buChar char="●"/>
-            </a:pPr>
-            <a:r>
-              <a:rPr lang="en" sz="1400" u="sng">
-                <a:solidFill>
-                  <a:schemeClr val="hlink"/>
-                </a:solidFill>
-                <a:latin typeface="Work Sans"/>
-                <a:ea typeface="Work Sans"/>
-                <a:cs typeface="Work Sans"/>
-                <a:sym typeface="Work Sans"/>
-                <a:hlinkClick r:id="rId5"/>
-              </a:rPr>
-              <a:t>http://fontpair.co/</a:t>
-            </a:r>
-          </a:p>
-          <a:p>
-            <a:pPr indent="-317500" lvl="0" marL="457200">
-              <a:spcBef>
-                <a:spcPts val="0"/>
-              </a:spcBef>
-              <a:spcAft>
-                <a:spcPts val="0"/>
-              </a:spcAft>
-              <a:buSzPct val="100000"/>
-              <a:buFont typeface="Work Sans"/>
-              <a:buChar char="●"/>
-            </a:pPr>
+            </a:br>
             <a:r>
               <a:rPr lang="en" sz="1400">
                 <a:latin typeface="Work Sans"/>
@@ -4362,48 +4523,7 @@
                 <a:cs typeface="Work Sans"/>
                 <a:sym typeface="Work Sans"/>
               </a:rPr>
-              <a:t>http://fonts.greatsimple.io/</a:t>
-            </a:r>
-          </a:p>
-        </p:txBody>
-      </p:sp>
-      <p:sp>
-        <p:nvSpPr>
-          <p:cNvPr id="62" name="Shape 62"/>
-          <p:cNvSpPr txBox="1"/>
-          <p:nvPr>
-            <p:ph idx="1" type="subTitle"/>
-          </p:nvPr>
-        </p:nvSpPr>
-        <p:spPr>
-          <a:xfrm>
-            <a:off x="265500" y="2803075"/>
-            <a:ext cx="4045200" cy="1235100"/>
-          </a:xfrm>
-          <a:prstGeom prst="rect">
-            <a:avLst/>
-          </a:prstGeom>
-        </p:spPr>
-        <p:txBody>
-          <a:bodyPr anchorCtr="0" anchor="t" bIns="91425" lIns="91425" rIns="91425" wrap="square" tIns="91425">
-            <a:noAutofit/>
-          </a:bodyPr>
-          <a:lstStyle/>
-          <a:p>
-            <a:pPr lvl="0">
-              <a:spcBef>
-                <a:spcPts val="0"/>
-              </a:spcBef>
-              <a:buNone/>
-            </a:pPr>
-            <a:r>
-              <a:rPr lang="en" sz="1600">
-                <a:latin typeface="Work Sans"/>
-                <a:ea typeface="Work Sans"/>
-                <a:cs typeface="Work Sans"/>
-                <a:sym typeface="Work Sans"/>
-              </a:rPr>
-              <a:t>Google Fonts has a fantastic collection of font resources that are ready for the web.</a:t>
+              <a:t>For better schemes and palettes.</a:t>
             </a:r>
           </a:p>
         </p:txBody>
@@ -4469,7 +4589,7 @@
                 <a:cs typeface="Work Sans"/>
                 <a:sym typeface="Work Sans"/>
               </a:rPr>
-              <a:t>Picture Fonts</a:t>
+              <a:t>Good Fonts</a:t>
             </a:r>
           </a:p>
         </p:txBody>
@@ -4479,47 +4599,6 @@
           <p:cNvPr id="68" name="Shape 68"/>
           <p:cNvSpPr txBox="1"/>
           <p:nvPr>
-            <p:ph idx="1" type="subTitle"/>
-          </p:nvPr>
-        </p:nvSpPr>
-        <p:spPr>
-          <a:xfrm>
-            <a:off x="265500" y="2803075"/>
-            <a:ext cx="4045200" cy="1235100"/>
-          </a:xfrm>
-          <a:prstGeom prst="rect">
-            <a:avLst/>
-          </a:prstGeom>
-        </p:spPr>
-        <p:txBody>
-          <a:bodyPr anchorCtr="0" anchor="t" bIns="91425" lIns="91425" rIns="91425" wrap="square" tIns="91425">
-            <a:noAutofit/>
-          </a:bodyPr>
-          <a:lstStyle/>
-          <a:p>
-            <a:pPr lvl="0" rtl="0">
-              <a:spcBef>
-                <a:spcPts val="0"/>
-              </a:spcBef>
-              <a:buNone/>
-            </a:pPr>
-            <a:r>
-              <a:rPr lang="en" sz="1600">
-                <a:latin typeface="Work Sans"/>
-                <a:ea typeface="Work Sans"/>
-                <a:cs typeface="Work Sans"/>
-                <a:sym typeface="Work Sans"/>
-              </a:rPr>
-              <a:t>Need icons? These are easy to embed too. One addition to your header for thousands of pictures.</a:t>
-            </a:r>
-          </a:p>
-        </p:txBody>
-      </p:sp>
-      <p:sp>
-        <p:nvSpPr>
-          <p:cNvPr id="69" name="Shape 69"/>
-          <p:cNvSpPr txBox="1"/>
-          <p:nvPr>
             <p:ph idx="2" type="body"/>
           </p:nvPr>
         </p:nvSpPr>
@@ -4538,26 +4617,17 @@
           </a:bodyPr>
           <a:lstStyle/>
           <a:p>
-            <a:pPr indent="-317500" lvl="0" marL="457200" rtl="0">
+            <a:pPr indent="-342900" lvl="0" marL="457200" rtl="0">
               <a:spcBef>
                 <a:spcPts val="0"/>
               </a:spcBef>
               <a:spcAft>
                 <a:spcPts val="0"/>
               </a:spcAft>
-              <a:buSzPct val="77777"/>
+              <a:buSzPct val="100000"/>
               <a:buFont typeface="Work Sans"/>
-              <a:buChar char="●"/>
+              <a:buAutoNum type="arabicPeriod"/>
             </a:pPr>
-            <a:r>
-              <a:rPr lang="en">
-                <a:latin typeface="Work Sans"/>
-                <a:ea typeface="Work Sans"/>
-                <a:cs typeface="Work Sans"/>
-                <a:sym typeface="Work Sans"/>
-              </a:rPr>
-              <a:t>FontAwesome (</a:t>
-            </a:r>
             <a:r>
               <a:rPr lang="en" u="sng">
                 <a:solidFill>
@@ -4569,8 +4639,21 @@
                 <a:sym typeface="Work Sans"/>
                 <a:hlinkClick r:id="rId3"/>
               </a:rPr>
-              <a:t>http://fontawesome.io/</a:t>
-            </a:r>
+              <a:t>https://fonts.google.com/</a:t>
+            </a:r>
+          </a:p>
+          <a:p>
+            <a:pPr indent="-317500" lvl="1" marL="914400" rtl="0">
+              <a:spcBef>
+                <a:spcPts val="0"/>
+              </a:spcBef>
+              <a:spcAft>
+                <a:spcPts val="0"/>
+              </a:spcAft>
+              <a:buSzPct val="100000"/>
+              <a:buFont typeface="Work Sans"/>
+              <a:buAutoNum type="alphaLcPeriod"/>
+            </a:pPr>
             <a:r>
               <a:rPr lang="en">
                 <a:latin typeface="Work Sans"/>
@@ -4578,7 +4661,7 @@
                 <a:cs typeface="Work Sans"/>
                 <a:sym typeface="Work Sans"/>
               </a:rPr>
-              <a:t>)</a:t>
+              <a:t>Select font, copy and paste the "embed font" link in your webpage head.</a:t>
             </a:r>
           </a:p>
           <a:p>
@@ -4586,12 +4669,9 @@
               <a:spcBef>
                 <a:spcPts val="0"/>
               </a:spcBef>
-              <a:spcAft>
-                <a:spcPts val="0"/>
-              </a:spcAft>
               <a:buSzPct val="100000"/>
               <a:buFont typeface="Work Sans"/>
-              <a:buChar char="○"/>
+              <a:buAutoNum type="alphaLcPeriod"/>
             </a:pPr>
             <a:r>
               <a:rPr lang="en">
@@ -4600,49 +4680,63 @@
                 <a:cs typeface="Work Sans"/>
                 <a:sym typeface="Work Sans"/>
               </a:rPr>
-              <a:t>Provides a ton of amazing fonts for free, CDN available</a:t>
+              <a:t>Specify the font in your CSS.</a:t>
             </a:r>
           </a:p>
           <a:p>
-            <a:pPr indent="-342900" lvl="0" marL="457200" rtl="0">
+            <a:pPr lvl="0" rtl="0">
               <a:spcBef>
                 <a:spcPts val="0"/>
               </a:spcBef>
               <a:spcAft>
                 <a:spcPts val="0"/>
               </a:spcAft>
-              <a:buSzPct val="100000"/>
-              <a:buFont typeface="Work Sans"/>
-              <a:buChar char="●"/>
+              <a:buNone/>
             </a:pPr>
             <a:r>
-              <a:rPr lang="en">
+              <a:t/>
+            </a:r>
+            <a:endParaRPr sz="1400">
+              <a:latin typeface="Work Sans"/>
+              <a:ea typeface="Work Sans"/>
+              <a:cs typeface="Work Sans"/>
+              <a:sym typeface="Work Sans"/>
+            </a:endParaRPr>
+          </a:p>
+          <a:p>
+            <a:pPr lvl="0" rtl="0">
+              <a:spcBef>
+                <a:spcPts val="0"/>
+              </a:spcBef>
+              <a:spcAft>
+                <a:spcPts val="0"/>
+              </a:spcAft>
+              <a:buNone/>
+            </a:pPr>
+            <a:r>
+              <a:rPr lang="en" sz="1400">
                 <a:latin typeface="Work Sans"/>
                 <a:ea typeface="Work Sans"/>
                 <a:cs typeface="Work Sans"/>
                 <a:sym typeface="Work Sans"/>
               </a:rPr>
-              <a:t>Fontello</a:t>
-            </a:r>
-            <a:br>
-              <a:rPr lang="en">
-                <a:latin typeface="Work Sans"/>
-                <a:ea typeface="Work Sans"/>
-                <a:cs typeface="Work Sans"/>
-                <a:sym typeface="Work Sans"/>
-              </a:rPr>
-            </a:br>
-            <a:r>
-              <a:rPr lang="en">
-                <a:latin typeface="Work Sans"/>
-                <a:ea typeface="Work Sans"/>
-                <a:cs typeface="Work Sans"/>
-                <a:sym typeface="Work Sans"/>
-              </a:rPr>
-              <a:t>(</a:t>
-            </a:r>
-            <a:r>
-              <a:rPr lang="en" u="sng">
+              <a:t>For design inspiration and pairings:</a:t>
+            </a:r>
+          </a:p>
+          <a:p>
+            <a:pPr indent="-317500" lvl="0" marL="457200" rtl="0">
+              <a:spcBef>
+                <a:spcPts val="0"/>
+              </a:spcBef>
+              <a:spcAft>
+                <a:spcPts val="0"/>
+              </a:spcAft>
+              <a:buSzPct val="100000"/>
+              <a:buFont typeface="Work Sans"/>
+              <a:buChar char="●"/>
+            </a:pPr>
+            <a:r>
+              <a:rPr lang="en" sz="1400" u="sng">
                 <a:solidFill>
                   <a:schemeClr val="hlink"/>
                 </a:solidFill>
@@ -4652,20 +4746,11 @@
                 <a:sym typeface="Work Sans"/>
                 <a:hlinkClick r:id="rId4"/>
               </a:rPr>
-              <a:t>http://fontello.com/</a:t>
-            </a:r>
-            <a:r>
-              <a:rPr lang="en">
-                <a:latin typeface="Work Sans"/>
-                <a:ea typeface="Work Sans"/>
-                <a:cs typeface="Work Sans"/>
-                <a:sym typeface="Work Sans"/>
-              </a:rPr>
-              <a:t>)</a:t>
+              <a:t>https://www.typewolf.com/</a:t>
             </a:r>
           </a:p>
           <a:p>
-            <a:pPr indent="-317500" lvl="1" marL="914400" rtl="0">
+            <a:pPr indent="-317500" lvl="0" marL="457200" rtl="0">
               <a:spcBef>
                 <a:spcPts val="0"/>
               </a:spcBef>
@@ -4673,51 +4758,11 @@
                 <a:spcPts val="0"/>
               </a:spcAft>
               <a:buSzPct val="100000"/>
-              <a:buFont typeface="Work Sans"/>
-              <a:buChar char="○"/>
-            </a:pPr>
-            <a:r>
-              <a:rPr lang="en">
-                <a:latin typeface="Work Sans"/>
-                <a:ea typeface="Work Sans"/>
-                <a:cs typeface="Work Sans"/>
-                <a:sym typeface="Work Sans"/>
-              </a:rPr>
-              <a:t>Generator with fonts to choose from</a:t>
-            </a:r>
-          </a:p>
-          <a:p>
-            <a:pPr indent="-342900" lvl="0" marL="457200" rtl="0">
-              <a:spcBef>
-                <a:spcPts val="0"/>
-              </a:spcBef>
-              <a:spcAft>
-                <a:spcPts val="0"/>
-              </a:spcAft>
-              <a:buSzPct val="112500"/>
               <a:buFont typeface="Work Sans"/>
               <a:buChar char="●"/>
             </a:pPr>
             <a:r>
-              <a:rPr lang="en">
-                <a:latin typeface="Work Sans"/>
-                <a:ea typeface="Work Sans"/>
-                <a:cs typeface="Work Sans"/>
-                <a:sym typeface="Work Sans"/>
-              </a:rPr>
-              <a:t>Linear Icons </a:t>
-            </a:r>
-            <a:r>
-              <a:rPr lang="en" sz="1600">
-                <a:latin typeface="Work Sans"/>
-                <a:ea typeface="Work Sans"/>
-                <a:cs typeface="Work Sans"/>
-                <a:sym typeface="Work Sans"/>
-              </a:rPr>
-              <a:t>(</a:t>
-            </a:r>
-            <a:r>
-              <a:rPr lang="en" sz="1600" u="sng">
+              <a:rPr lang="en" sz="1400" u="sng">
                 <a:solidFill>
                   <a:schemeClr val="hlink"/>
                 </a:solidFill>
@@ -4727,8 +4772,62 @@
                 <a:sym typeface="Work Sans"/>
                 <a:hlinkClick r:id="rId5"/>
               </a:rPr>
-              <a:t>https://linearicons.com/free</a:t>
-            </a:r>
+              <a:t>http://fontpair.co/</a:t>
+            </a:r>
+          </a:p>
+          <a:p>
+            <a:pPr indent="-317500" lvl="0" marL="457200" rtl="0">
+              <a:spcBef>
+                <a:spcPts val="0"/>
+              </a:spcBef>
+              <a:spcAft>
+                <a:spcPts val="0"/>
+              </a:spcAft>
+              <a:buSzPct val="100000"/>
+              <a:buFont typeface="Work Sans"/>
+              <a:buChar char="●"/>
+            </a:pPr>
+            <a:r>
+              <a:rPr lang="en" sz="1400">
+                <a:latin typeface="Work Sans"/>
+                <a:ea typeface="Work Sans"/>
+                <a:cs typeface="Work Sans"/>
+                <a:sym typeface="Work Sans"/>
+              </a:rPr>
+              <a:t>http://fonts.greatsimple.io/</a:t>
+            </a:r>
+          </a:p>
+        </p:txBody>
+      </p:sp>
+      <p:sp>
+        <p:nvSpPr>
+          <p:cNvPr id="69" name="Shape 69"/>
+          <p:cNvSpPr txBox="1"/>
+          <p:nvPr>
+            <p:ph idx="1" type="subTitle"/>
+          </p:nvPr>
+        </p:nvSpPr>
+        <p:spPr>
+          <a:xfrm>
+            <a:off x="265500" y="2803075"/>
+            <a:ext cx="4045200" cy="1235100"/>
+          </a:xfrm>
+          <a:prstGeom prst="rect">
+            <a:avLst/>
+          </a:prstGeom>
+        </p:spPr>
+        <p:txBody>
+          <a:bodyPr anchorCtr="0" anchor="t" bIns="91425" lIns="91425" rIns="91425" wrap="square" tIns="91425">
+            <a:noAutofit/>
+          </a:bodyPr>
+          <a:lstStyle/>
+          <a:p>
+            <a:pPr lvl="0" rtl="0">
+              <a:spcBef>
+                <a:spcPts val="0"/>
+              </a:spcBef>
+              <a:buNone/>
+            </a:pPr>
             <a:r>
               <a:rPr lang="en" sz="1600">
                 <a:latin typeface="Work Sans"/>
@@ -4736,29 +4835,7 @@
                 <a:cs typeface="Work Sans"/>
                 <a:sym typeface="Work Sans"/>
               </a:rPr>
-              <a:t>)</a:t>
-            </a:r>
-          </a:p>
-          <a:p>
-            <a:pPr indent="-317500" lvl="1" marL="914400" rtl="0">
-              <a:spcBef>
-                <a:spcPts val="0"/>
-              </a:spcBef>
-              <a:spcAft>
-                <a:spcPts val="0"/>
-              </a:spcAft>
-              <a:buSzPct val="100000"/>
-              <a:buFont typeface="Work Sans"/>
-              <a:buChar char="○"/>
-            </a:pPr>
-            <a:r>
-              <a:rPr lang="en">
-                <a:latin typeface="Work Sans"/>
-                <a:ea typeface="Work Sans"/>
-                <a:cs typeface="Work Sans"/>
-                <a:sym typeface="Work Sans"/>
-              </a:rPr>
-              <a:t>Limited free collection, but easy to set-up</a:t>
+              <a:t>Google Fonts has a fantastic collection of font resources that are ready for the web.</a:t>
             </a:r>
           </a:p>
         </p:txBody>
@@ -4824,7 +4901,7 @@
                 <a:cs typeface="Work Sans"/>
                 <a:sym typeface="Work Sans"/>
               </a:rPr>
-              <a:t>Transition Abuse</a:t>
+              <a:t>Picture Fonts</a:t>
             </a:r>
           </a:p>
         </p:txBody>
@@ -4832,6 +4909,361 @@
       <p:sp>
         <p:nvSpPr>
           <p:cNvPr id="75" name="Shape 75"/>
+          <p:cNvSpPr txBox="1"/>
+          <p:nvPr>
+            <p:ph idx="1" type="subTitle"/>
+          </p:nvPr>
+        </p:nvSpPr>
+        <p:spPr>
+          <a:xfrm>
+            <a:off x="265500" y="2803075"/>
+            <a:ext cx="4045200" cy="1235100"/>
+          </a:xfrm>
+          <a:prstGeom prst="rect">
+            <a:avLst/>
+          </a:prstGeom>
+        </p:spPr>
+        <p:txBody>
+          <a:bodyPr anchorCtr="0" anchor="t" bIns="91425" lIns="91425" rIns="91425" wrap="square" tIns="91425">
+            <a:noAutofit/>
+          </a:bodyPr>
+          <a:lstStyle/>
+          <a:p>
+            <a:pPr lvl="0" rtl="0">
+              <a:spcBef>
+                <a:spcPts val="0"/>
+              </a:spcBef>
+              <a:buNone/>
+            </a:pPr>
+            <a:r>
+              <a:rPr lang="en" sz="1600">
+                <a:latin typeface="Work Sans"/>
+                <a:ea typeface="Work Sans"/>
+                <a:cs typeface="Work Sans"/>
+                <a:sym typeface="Work Sans"/>
+              </a:rPr>
+              <a:t>Need icons? These are easy to embed too. One addition to your header for thousands of pictures.</a:t>
+            </a:r>
+          </a:p>
+        </p:txBody>
+      </p:sp>
+      <p:sp>
+        <p:nvSpPr>
+          <p:cNvPr id="76" name="Shape 76"/>
+          <p:cNvSpPr txBox="1"/>
+          <p:nvPr>
+            <p:ph idx="2" type="body"/>
+          </p:nvPr>
+        </p:nvSpPr>
+        <p:spPr>
+          <a:xfrm>
+            <a:off x="4939500" y="724075"/>
+            <a:ext cx="3837000" cy="3695100"/>
+          </a:xfrm>
+          <a:prstGeom prst="rect">
+            <a:avLst/>
+          </a:prstGeom>
+        </p:spPr>
+        <p:txBody>
+          <a:bodyPr anchorCtr="0" anchor="ctr" bIns="91425" lIns="91425" rIns="91425" wrap="square" tIns="91425">
+            <a:noAutofit/>
+          </a:bodyPr>
+          <a:lstStyle/>
+          <a:p>
+            <a:pPr indent="-317500" lvl="0" marL="457200" rtl="0">
+              <a:spcBef>
+                <a:spcPts val="0"/>
+              </a:spcBef>
+              <a:spcAft>
+                <a:spcPts val="0"/>
+              </a:spcAft>
+              <a:buSzPct val="77777"/>
+              <a:buFont typeface="Work Sans"/>
+              <a:buChar char="●"/>
+            </a:pPr>
+            <a:r>
+              <a:rPr lang="en">
+                <a:latin typeface="Work Sans"/>
+                <a:ea typeface="Work Sans"/>
+                <a:cs typeface="Work Sans"/>
+                <a:sym typeface="Work Sans"/>
+              </a:rPr>
+              <a:t>FontAwesome (</a:t>
+            </a:r>
+            <a:r>
+              <a:rPr lang="en" u="sng">
+                <a:solidFill>
+                  <a:schemeClr val="hlink"/>
+                </a:solidFill>
+                <a:latin typeface="Work Sans"/>
+                <a:ea typeface="Work Sans"/>
+                <a:cs typeface="Work Sans"/>
+                <a:sym typeface="Work Sans"/>
+                <a:hlinkClick r:id="rId3"/>
+              </a:rPr>
+              <a:t>http://fontawesome.io/</a:t>
+            </a:r>
+            <a:r>
+              <a:rPr lang="en">
+                <a:latin typeface="Work Sans"/>
+                <a:ea typeface="Work Sans"/>
+                <a:cs typeface="Work Sans"/>
+                <a:sym typeface="Work Sans"/>
+              </a:rPr>
+              <a:t>)</a:t>
+            </a:r>
+          </a:p>
+          <a:p>
+            <a:pPr indent="-317500" lvl="1" marL="914400" rtl="0">
+              <a:spcBef>
+                <a:spcPts val="0"/>
+              </a:spcBef>
+              <a:spcAft>
+                <a:spcPts val="0"/>
+              </a:spcAft>
+              <a:buSzPct val="100000"/>
+              <a:buFont typeface="Work Sans"/>
+              <a:buChar char="○"/>
+            </a:pPr>
+            <a:r>
+              <a:rPr lang="en">
+                <a:latin typeface="Work Sans"/>
+                <a:ea typeface="Work Sans"/>
+                <a:cs typeface="Work Sans"/>
+                <a:sym typeface="Work Sans"/>
+              </a:rPr>
+              <a:t>Provides a ton of amazing fonts for free, CDN available</a:t>
+            </a:r>
+          </a:p>
+          <a:p>
+            <a:pPr indent="-342900" lvl="0" marL="457200" rtl="0">
+              <a:spcBef>
+                <a:spcPts val="0"/>
+              </a:spcBef>
+              <a:spcAft>
+                <a:spcPts val="0"/>
+              </a:spcAft>
+              <a:buSzPct val="100000"/>
+              <a:buFont typeface="Work Sans"/>
+              <a:buChar char="●"/>
+            </a:pPr>
+            <a:r>
+              <a:rPr lang="en">
+                <a:latin typeface="Work Sans"/>
+                <a:ea typeface="Work Sans"/>
+                <a:cs typeface="Work Sans"/>
+                <a:sym typeface="Work Sans"/>
+              </a:rPr>
+              <a:t>Fontello</a:t>
+            </a:r>
+            <a:br>
+              <a:rPr lang="en">
+                <a:latin typeface="Work Sans"/>
+                <a:ea typeface="Work Sans"/>
+                <a:cs typeface="Work Sans"/>
+                <a:sym typeface="Work Sans"/>
+              </a:rPr>
+            </a:br>
+            <a:r>
+              <a:rPr lang="en">
+                <a:latin typeface="Work Sans"/>
+                <a:ea typeface="Work Sans"/>
+                <a:cs typeface="Work Sans"/>
+                <a:sym typeface="Work Sans"/>
+              </a:rPr>
+              <a:t>(</a:t>
+            </a:r>
+            <a:r>
+              <a:rPr lang="en" u="sng">
+                <a:solidFill>
+                  <a:schemeClr val="hlink"/>
+                </a:solidFill>
+                <a:latin typeface="Work Sans"/>
+                <a:ea typeface="Work Sans"/>
+                <a:cs typeface="Work Sans"/>
+                <a:sym typeface="Work Sans"/>
+                <a:hlinkClick r:id="rId4"/>
+              </a:rPr>
+              <a:t>http://fontello.com/</a:t>
+            </a:r>
+            <a:r>
+              <a:rPr lang="en">
+                <a:latin typeface="Work Sans"/>
+                <a:ea typeface="Work Sans"/>
+                <a:cs typeface="Work Sans"/>
+                <a:sym typeface="Work Sans"/>
+              </a:rPr>
+              <a:t>)</a:t>
+            </a:r>
+          </a:p>
+          <a:p>
+            <a:pPr indent="-317500" lvl="1" marL="914400" rtl="0">
+              <a:spcBef>
+                <a:spcPts val="0"/>
+              </a:spcBef>
+              <a:spcAft>
+                <a:spcPts val="0"/>
+              </a:spcAft>
+              <a:buSzPct val="100000"/>
+              <a:buFont typeface="Work Sans"/>
+              <a:buChar char="○"/>
+            </a:pPr>
+            <a:r>
+              <a:rPr lang="en">
+                <a:latin typeface="Work Sans"/>
+                <a:ea typeface="Work Sans"/>
+                <a:cs typeface="Work Sans"/>
+                <a:sym typeface="Work Sans"/>
+              </a:rPr>
+              <a:t>Generator with fonts to choose from</a:t>
+            </a:r>
+          </a:p>
+          <a:p>
+            <a:pPr indent="-342900" lvl="0" marL="457200" rtl="0">
+              <a:spcBef>
+                <a:spcPts val="0"/>
+              </a:spcBef>
+              <a:spcAft>
+                <a:spcPts val="0"/>
+              </a:spcAft>
+              <a:buSzPct val="112500"/>
+              <a:buFont typeface="Work Sans"/>
+              <a:buChar char="●"/>
+            </a:pPr>
+            <a:r>
+              <a:rPr lang="en">
+                <a:latin typeface="Work Sans"/>
+                <a:ea typeface="Work Sans"/>
+                <a:cs typeface="Work Sans"/>
+                <a:sym typeface="Work Sans"/>
+              </a:rPr>
+              <a:t>Linear Icons </a:t>
+            </a:r>
+            <a:r>
+              <a:rPr lang="en" sz="1600">
+                <a:latin typeface="Work Sans"/>
+                <a:ea typeface="Work Sans"/>
+                <a:cs typeface="Work Sans"/>
+                <a:sym typeface="Work Sans"/>
+              </a:rPr>
+              <a:t>(</a:t>
+            </a:r>
+            <a:r>
+              <a:rPr lang="en" sz="1600" u="sng">
+                <a:solidFill>
+                  <a:schemeClr val="hlink"/>
+                </a:solidFill>
+                <a:latin typeface="Work Sans"/>
+                <a:ea typeface="Work Sans"/>
+                <a:cs typeface="Work Sans"/>
+                <a:sym typeface="Work Sans"/>
+                <a:hlinkClick r:id="rId5"/>
+              </a:rPr>
+              <a:t>https://linearicons.com/free</a:t>
+            </a:r>
+            <a:r>
+              <a:rPr lang="en" sz="1600">
+                <a:latin typeface="Work Sans"/>
+                <a:ea typeface="Work Sans"/>
+                <a:cs typeface="Work Sans"/>
+                <a:sym typeface="Work Sans"/>
+              </a:rPr>
+              <a:t>)</a:t>
+            </a:r>
+          </a:p>
+          <a:p>
+            <a:pPr indent="-317500" lvl="1" marL="914400" rtl="0">
+              <a:spcBef>
+                <a:spcPts val="0"/>
+              </a:spcBef>
+              <a:spcAft>
+                <a:spcPts val="0"/>
+              </a:spcAft>
+              <a:buSzPct val="100000"/>
+              <a:buFont typeface="Work Sans"/>
+              <a:buChar char="○"/>
+            </a:pPr>
+            <a:r>
+              <a:rPr lang="en">
+                <a:latin typeface="Work Sans"/>
+                <a:ea typeface="Work Sans"/>
+                <a:cs typeface="Work Sans"/>
+                <a:sym typeface="Work Sans"/>
+              </a:rPr>
+              <a:t>Limited free collection, but easy to set-up</a:t>
+            </a:r>
+          </a:p>
+        </p:txBody>
+      </p:sp>
+    </p:spTree>
+  </p:cSld>
+  <p:clrMapOvr>
+    <a:masterClrMapping/>
+  </p:clrMapOvr>
+</p:sld>
+</file>
+
+<file path=ppt/slides/slide5.xml><?xml version="1.0" encoding="utf-8"?>
+<p:sld xmlns:a="http://schemas.openxmlformats.org/drawingml/2006/main" xmlns:r="http://schemas.openxmlformats.org/officeDocument/2006/relationships" xmlns:mc="http://schemas.openxmlformats.org/markup-compatibility/2006" xmlns:mv="urn:schemas-microsoft-com:mac:vml" xmlns:p="http://schemas.openxmlformats.org/presentationml/2006/main" xmlns:c="http://schemas.openxmlformats.org/drawingml/2006/chart" xmlns:dgm="http://schemas.openxmlformats.org/drawingml/2006/diagram" xmlns:o="urn:schemas-microsoft-com:office:office" xmlns:v="urn:schemas-microsoft-com:vml" xmlns:pvml="urn:schemas-microsoft-com:office:powerpoint" xmlns:com="http://schemas.openxmlformats.org/drawingml/2006/compatibility" xmlns:p14="http://schemas.microsoft.com/office/powerpoint/2010/main" xmlns:p15="http://schemas.microsoft.com/office/powerpoint/2012/main">
+  <p:cSld>
+    <p:spTree>
+      <p:nvGrpSpPr>
+        <p:cNvPr id="80" name="Shape 80"/>
+        <p:cNvGrpSpPr/>
+        <p:nvPr/>
+      </p:nvGrpSpPr>
+      <p:grpSpPr>
+        <a:xfrm>
+          <a:off x="0" y="0"/>
+          <a:ext cx="0" cy="0"/>
+          <a:chOff x="0" y="0"/>
+          <a:chExt cx="0" cy="0"/>
+        </a:xfrm>
+      </p:grpSpPr>
+      <p:sp>
+        <p:nvSpPr>
+          <p:cNvPr id="81" name="Shape 81"/>
+          <p:cNvSpPr txBox="1"/>
+          <p:nvPr>
+            <p:ph type="title"/>
+          </p:nvPr>
+        </p:nvSpPr>
+        <p:spPr>
+          <a:xfrm>
+            <a:off x="265500" y="1233175"/>
+            <a:ext cx="4045200" cy="1482300"/>
+          </a:xfrm>
+          <a:prstGeom prst="rect">
+            <a:avLst/>
+          </a:prstGeom>
+        </p:spPr>
+        <p:txBody>
+          <a:bodyPr anchorCtr="0" anchor="b" bIns="91425" lIns="91425" rIns="91425" wrap="square" tIns="91425">
+            <a:noAutofit/>
+          </a:bodyPr>
+          <a:lstStyle/>
+          <a:p>
+            <a:pPr lvl="0" rtl="0">
+              <a:spcBef>
+                <a:spcPts val="0"/>
+              </a:spcBef>
+              <a:buNone/>
+            </a:pPr>
+            <a:r>
+              <a:rPr lang="en">
+                <a:latin typeface="Work Sans"/>
+                <a:ea typeface="Work Sans"/>
+                <a:cs typeface="Work Sans"/>
+                <a:sym typeface="Work Sans"/>
+              </a:rPr>
+              <a:t>Transition Abuse</a:t>
+            </a:r>
+          </a:p>
+        </p:txBody>
+      </p:sp>
+      <p:sp>
+        <p:nvSpPr>
+          <p:cNvPr id="82" name="Shape 82"/>
           <p:cNvSpPr txBox="1"/>
           <p:nvPr>
             <p:ph idx="2" type="body"/>
@@ -4908,20 +5340,76 @@
               <a:buChar char="●"/>
             </a:pPr>
             <a:r>
-              <a:t/>
-            </a:r>
-            <a:endParaRPr sz="1400">
-              <a:latin typeface="Work Sans"/>
-              <a:ea typeface="Work Sans"/>
-              <a:cs typeface="Work Sans"/>
-              <a:sym typeface="Work Sans"/>
-            </a:endParaRPr>
+              <a:rPr lang="en" sz="1400">
+                <a:latin typeface="Work Sans"/>
+                <a:ea typeface="Work Sans"/>
+                <a:cs typeface="Work Sans"/>
+                <a:sym typeface="Work Sans"/>
+              </a:rPr>
+              <a:t>CSS Transitions</a:t>
+            </a:r>
+            <a:br>
+              <a:rPr lang="en" sz="1400">
+                <a:latin typeface="Work Sans"/>
+                <a:ea typeface="Work Sans"/>
+                <a:cs typeface="Work Sans"/>
+                <a:sym typeface="Work Sans"/>
+              </a:rPr>
+            </a:br>
+            <a:r>
+              <a:rPr lang="en" sz="1400">
+                <a:latin typeface="Work Sans"/>
+                <a:ea typeface="Work Sans"/>
+                <a:cs typeface="Work Sans"/>
+                <a:sym typeface="Work Sans"/>
+              </a:rPr>
+              <a:t>(</a:t>
+            </a:r>
+            <a:r>
+              <a:rPr lang="en" sz="1400" u="sng">
+                <a:solidFill>
+                  <a:schemeClr val="hlink"/>
+                </a:solidFill>
+                <a:latin typeface="Work Sans"/>
+                <a:ea typeface="Work Sans"/>
+                <a:cs typeface="Work Sans"/>
+                <a:sym typeface="Work Sans"/>
+                <a:hlinkClick r:id="rId4"/>
+              </a:rPr>
+              <a:t>http://css3.bradshawenterprises.com/transitions/</a:t>
+            </a:r>
+            <a:r>
+              <a:rPr lang="en" sz="1400">
+                <a:latin typeface="Work Sans"/>
+                <a:ea typeface="Work Sans"/>
+                <a:cs typeface="Work Sans"/>
+                <a:sym typeface="Work Sans"/>
+              </a:rPr>
+              <a:t>)</a:t>
+            </a:r>
+            <a:br>
+              <a:rPr lang="en" sz="1400">
+                <a:latin typeface="Work Sans"/>
+                <a:ea typeface="Work Sans"/>
+                <a:cs typeface="Work Sans"/>
+                <a:sym typeface="Work Sans"/>
+              </a:rPr>
+            </a:br>
+            <a:r>
+              <a:rPr lang="en" sz="1400">
+                <a:latin typeface="Work Sans"/>
+                <a:ea typeface="Work Sans"/>
+                <a:cs typeface="Work Sans"/>
+                <a:sym typeface="Work Sans"/>
+              </a:rPr>
+              <a:t>A good introductory tutorial and guide.</a:t>
+            </a:r>
           </a:p>
         </p:txBody>
       </p:sp>
       <p:sp>
         <p:nvSpPr>
-          <p:cNvPr id="76" name="Shape 76"/>
+          <p:cNvPr id="83" name="Shape 83"/>
           <p:cNvSpPr txBox="1"/>
           <p:nvPr>
             <p:ph idx="1" type="subTitle"/>
@@ -4994,6 +5482,289 @@
           </a:p>
         </p:txBody>
       </p:sp>
+    </p:spTree>
+  </p:cSld>
+  <p:clrMapOvr>
+    <a:masterClrMapping/>
+  </p:clrMapOvr>
+</p:sld>
+</file>
+
+<file path=ppt/slides/slide6.xml><?xml version="1.0" encoding="utf-8"?>
+<p:sld xmlns:a="http://schemas.openxmlformats.org/drawingml/2006/main" xmlns:r="http://schemas.openxmlformats.org/officeDocument/2006/relationships" xmlns:mc="http://schemas.openxmlformats.org/markup-compatibility/2006" xmlns:mv="urn:schemas-microsoft-com:mac:vml" xmlns:p="http://schemas.openxmlformats.org/presentationml/2006/main" xmlns:c="http://schemas.openxmlformats.org/drawingml/2006/chart" xmlns:dgm="http://schemas.openxmlformats.org/drawingml/2006/diagram" xmlns:o="urn:schemas-microsoft-com:office:office" xmlns:v="urn:schemas-microsoft-com:vml" xmlns:pvml="urn:schemas-microsoft-com:office:powerpoint" xmlns:com="http://schemas.openxmlformats.org/drawingml/2006/compatibility" xmlns:p14="http://schemas.microsoft.com/office/powerpoint/2010/main" xmlns:p15="http://schemas.microsoft.com/office/powerpoint/2012/main">
+  <p:cSld>
+    <p:spTree>
+      <p:nvGrpSpPr>
+        <p:cNvPr id="87" name="Shape 87"/>
+        <p:cNvGrpSpPr/>
+        <p:nvPr/>
+      </p:nvGrpSpPr>
+      <p:grpSpPr>
+        <a:xfrm>
+          <a:off x="0" y="0"/>
+          <a:ext cx="0" cy="0"/>
+          <a:chOff x="0" y="0"/>
+          <a:chExt cx="0" cy="0"/>
+        </a:xfrm>
+      </p:grpSpPr>
+      <p:sp>
+        <p:nvSpPr>
+          <p:cNvPr id="88" name="Shape 88"/>
+          <p:cNvSpPr txBox="1"/>
+          <p:nvPr>
+            <p:ph type="title"/>
+          </p:nvPr>
+        </p:nvSpPr>
+        <p:spPr>
+          <a:xfrm>
+            <a:off x="265500" y="1233175"/>
+            <a:ext cx="4045200" cy="1482300"/>
+          </a:xfrm>
+          <a:prstGeom prst="rect">
+            <a:avLst/>
+          </a:prstGeom>
+        </p:spPr>
+        <p:txBody>
+          <a:bodyPr anchorCtr="0" anchor="b" bIns="91425" lIns="91425" rIns="91425" wrap="square" tIns="91425">
+            <a:noAutofit/>
+          </a:bodyPr>
+          <a:lstStyle/>
+          <a:p>
+            <a:pPr lvl="0" rtl="0">
+              <a:spcBef>
+                <a:spcPts val="0"/>
+              </a:spcBef>
+              <a:buNone/>
+            </a:pPr>
+            <a:r>
+              <a:rPr lang="en">
+                <a:latin typeface="Work Sans"/>
+                <a:ea typeface="Work Sans"/>
+                <a:cs typeface="Work Sans"/>
+                <a:sym typeface="Work Sans"/>
+              </a:rPr>
+              <a:t>CSS Box Model</a:t>
+            </a:r>
+          </a:p>
+        </p:txBody>
+      </p:sp>
+      <p:sp>
+        <p:nvSpPr>
+          <p:cNvPr id="89" name="Shape 89"/>
+          <p:cNvSpPr txBox="1"/>
+          <p:nvPr>
+            <p:ph idx="2" type="body"/>
+          </p:nvPr>
+        </p:nvSpPr>
+        <p:spPr>
+          <a:xfrm>
+            <a:off x="4939500" y="2676875"/>
+            <a:ext cx="3837000" cy="2170800"/>
+          </a:xfrm>
+          <a:prstGeom prst="rect">
+            <a:avLst/>
+          </a:prstGeom>
+        </p:spPr>
+        <p:txBody>
+          <a:bodyPr anchorCtr="0" anchor="ctr" bIns="91425" lIns="91425" rIns="91425" wrap="square" tIns="91425">
+            <a:noAutofit/>
+          </a:bodyPr>
+          <a:lstStyle/>
+          <a:p>
+            <a:pPr indent="-317500" lvl="0" marL="457200" rtl="0">
+              <a:spcBef>
+                <a:spcPts val="0"/>
+              </a:spcBef>
+              <a:spcAft>
+                <a:spcPts val="0"/>
+              </a:spcAft>
+              <a:buSzPct val="100000"/>
+              <a:buFont typeface="Work Sans"/>
+              <a:buChar char="●"/>
+            </a:pPr>
+            <a:r>
+              <a:rPr b="1" lang="en" sz="1400">
+                <a:latin typeface="Work Sans"/>
+                <a:ea typeface="Work Sans"/>
+                <a:cs typeface="Work Sans"/>
+                <a:sym typeface="Work Sans"/>
+              </a:rPr>
+              <a:t>Content </a:t>
+            </a:r>
+            <a:r>
+              <a:rPr lang="en" sz="1400">
+                <a:latin typeface="Work Sans"/>
+                <a:ea typeface="Work Sans"/>
+                <a:cs typeface="Work Sans"/>
+                <a:sym typeface="Work Sans"/>
+              </a:rPr>
+              <a:t>- The content of the box, where text and images appear</a:t>
+            </a:r>
+          </a:p>
+          <a:p>
+            <a:pPr indent="-317500" lvl="0" marL="457200" rtl="0">
+              <a:spcBef>
+                <a:spcPts val="0"/>
+              </a:spcBef>
+              <a:spcAft>
+                <a:spcPts val="0"/>
+              </a:spcAft>
+              <a:buSzPct val="100000"/>
+              <a:buFont typeface="Work Sans"/>
+              <a:buChar char="●"/>
+            </a:pPr>
+            <a:r>
+              <a:rPr b="1" lang="en" sz="1400">
+                <a:latin typeface="Work Sans"/>
+                <a:ea typeface="Work Sans"/>
+                <a:cs typeface="Work Sans"/>
+                <a:sym typeface="Work Sans"/>
+              </a:rPr>
+              <a:t>Padding </a:t>
+            </a:r>
+            <a:r>
+              <a:rPr lang="en" sz="1400">
+                <a:latin typeface="Work Sans"/>
+                <a:ea typeface="Work Sans"/>
+                <a:cs typeface="Work Sans"/>
+                <a:sym typeface="Work Sans"/>
+              </a:rPr>
+              <a:t>- Clears an area around the content. The padding is transparent</a:t>
+            </a:r>
+          </a:p>
+          <a:p>
+            <a:pPr indent="-317500" lvl="0" marL="457200" rtl="0">
+              <a:spcBef>
+                <a:spcPts val="0"/>
+              </a:spcBef>
+              <a:spcAft>
+                <a:spcPts val="0"/>
+              </a:spcAft>
+              <a:buSzPct val="100000"/>
+              <a:buFont typeface="Work Sans"/>
+              <a:buChar char="●"/>
+            </a:pPr>
+            <a:r>
+              <a:rPr b="1" lang="en" sz="1400">
+                <a:latin typeface="Work Sans"/>
+                <a:ea typeface="Work Sans"/>
+                <a:cs typeface="Work Sans"/>
+                <a:sym typeface="Work Sans"/>
+              </a:rPr>
+              <a:t>Border </a:t>
+            </a:r>
+            <a:r>
+              <a:rPr lang="en" sz="1400">
+                <a:latin typeface="Work Sans"/>
+                <a:ea typeface="Work Sans"/>
+                <a:cs typeface="Work Sans"/>
+                <a:sym typeface="Work Sans"/>
+              </a:rPr>
+              <a:t>- A border that goes around the padding and content</a:t>
+            </a:r>
+          </a:p>
+          <a:p>
+            <a:pPr indent="-317500" lvl="0" marL="457200" rtl="0">
+              <a:spcBef>
+                <a:spcPts val="0"/>
+              </a:spcBef>
+              <a:spcAft>
+                <a:spcPts val="0"/>
+              </a:spcAft>
+              <a:buSzPct val="100000"/>
+              <a:buFont typeface="Work Sans"/>
+              <a:buChar char="●"/>
+            </a:pPr>
+            <a:r>
+              <a:rPr b="1" lang="en" sz="1400">
+                <a:latin typeface="Work Sans"/>
+                <a:ea typeface="Work Sans"/>
+                <a:cs typeface="Work Sans"/>
+                <a:sym typeface="Work Sans"/>
+              </a:rPr>
+              <a:t>Margin </a:t>
+            </a:r>
+            <a:r>
+              <a:rPr lang="en" sz="1400">
+                <a:latin typeface="Work Sans"/>
+                <a:ea typeface="Work Sans"/>
+                <a:cs typeface="Work Sans"/>
+                <a:sym typeface="Work Sans"/>
+              </a:rPr>
+              <a:t>- Clears an area outside the border. The margin is transparent</a:t>
+            </a:r>
+          </a:p>
+        </p:txBody>
+      </p:sp>
+      <p:sp>
+        <p:nvSpPr>
+          <p:cNvPr id="90" name="Shape 90"/>
+          <p:cNvSpPr txBox="1"/>
+          <p:nvPr>
+            <p:ph idx="1" type="subTitle"/>
+          </p:nvPr>
+        </p:nvSpPr>
+        <p:spPr>
+          <a:xfrm>
+            <a:off x="265500" y="2803075"/>
+            <a:ext cx="4045200" cy="1235100"/>
+          </a:xfrm>
+          <a:prstGeom prst="rect">
+            <a:avLst/>
+          </a:prstGeom>
+        </p:spPr>
+        <p:txBody>
+          <a:bodyPr anchorCtr="0" anchor="t" bIns="91425" lIns="91425" rIns="91425" wrap="square" tIns="91425">
+            <a:noAutofit/>
+          </a:bodyPr>
+          <a:lstStyle/>
+          <a:p>
+            <a:pPr lvl="0" rtl="0">
+              <a:spcBef>
+                <a:spcPts val="0"/>
+              </a:spcBef>
+              <a:buNone/>
+            </a:pPr>
+            <a:r>
+              <a:rPr lang="en" sz="1600">
+                <a:latin typeface="Work Sans"/>
+                <a:ea typeface="Work Sans"/>
+                <a:cs typeface="Work Sans"/>
+                <a:sym typeface="Work Sans"/>
+              </a:rPr>
+              <a:t>Confused about padding, margins, and everything else? It's important to know the hierarchy of these properties – also known as the "CSS Box Model."</a:t>
+            </a:r>
+          </a:p>
+        </p:txBody>
+      </p:sp>
+      <p:pic>
+        <p:nvPicPr>
+          <p:cNvPr id="91" name="Shape 91"/>
+          <p:cNvPicPr preferRelativeResize="0"/>
+          <p:nvPr/>
+        </p:nvPicPr>
+        <p:blipFill>
+          <a:blip r:embed="rId3">
+            <a:alphaModFix/>
+          </a:blip>
+          <a:stretch>
+            <a:fillRect/>
+          </a:stretch>
+        </p:blipFill>
+        <p:spPr>
+          <a:xfrm>
+            <a:off x="5498425" y="304800"/>
+            <a:ext cx="2719161" cy="1943450"/>
+          </a:xfrm>
+          <a:prstGeom prst="rect">
+            <a:avLst/>
+          </a:prstGeom>
+          <a:noFill/>
+          <a:ln>
+            <a:noFill/>
+          </a:ln>
+        </p:spPr>
+      </p:pic>
     </p:spTree>
   </p:cSld>
   <p:clrMapOvr>

</xml_diff>